<commit_message>
Add new template & Update old template
</commit_message>
<xml_diff>
--- a/崇拜流程_version02.pptx
+++ b/崇拜流程_version02.pptx
@@ -253,7 +253,7 @@
           <a:p>
             <a:fld id="{2F30D4D0-EAC7-4980-A92D-C26C9148BA0F}" type="datetimeFigureOut">
               <a:rPr lang="zh-TW" altLang="en-US" smtClean="0"/>
-              <a:t>2021/6/3</a:t>
+              <a:t>2021/6/10</a:t>
             </a:fld>
             <a:endParaRPr lang="zh-TW" altLang="en-US"/>
           </a:p>
@@ -1043,7 +1043,7 @@
           <a:p>
             <a:fld id="{5BBEAD13-0566-4C6C-97E7-55F17F24B09F}" type="datetimeFigureOut">
               <a:rPr lang="zh-TW" altLang="en-US" smtClean="0"/>
-              <a:t>2021/6/3</a:t>
+              <a:t>2021/6/10</a:t>
             </a:fld>
             <a:endParaRPr lang="zh-TW" altLang="en-US"/>
           </a:p>
@@ -1208,7 +1208,7 @@
           <a:p>
             <a:fld id="{5BBEAD13-0566-4C6C-97E7-55F17F24B09F}" type="datetimeFigureOut">
               <a:rPr lang="zh-TW" altLang="en-US" smtClean="0"/>
-              <a:t>2021/6/3</a:t>
+              <a:t>2021/6/10</a:t>
             </a:fld>
             <a:endParaRPr lang="zh-TW" altLang="en-US"/>
           </a:p>
@@ -1383,7 +1383,7 @@
           <a:p>
             <a:fld id="{5BBEAD13-0566-4C6C-97E7-55F17F24B09F}" type="datetimeFigureOut">
               <a:rPr lang="zh-TW" altLang="en-US" smtClean="0"/>
-              <a:t>2021/6/3</a:t>
+              <a:t>2021/6/10</a:t>
             </a:fld>
             <a:endParaRPr lang="zh-TW" altLang="en-US"/>
           </a:p>
@@ -1548,7 +1548,7 @@
           <a:p>
             <a:fld id="{5BBEAD13-0566-4C6C-97E7-55F17F24B09F}" type="datetimeFigureOut">
               <a:rPr lang="zh-TW" altLang="en-US" smtClean="0"/>
-              <a:t>2021/6/3</a:t>
+              <a:t>2021/6/10</a:t>
             </a:fld>
             <a:endParaRPr lang="zh-TW" altLang="en-US"/>
           </a:p>
@@ -1789,7 +1789,7 @@
           <a:p>
             <a:fld id="{5BBEAD13-0566-4C6C-97E7-55F17F24B09F}" type="datetimeFigureOut">
               <a:rPr lang="zh-TW" altLang="en-US" smtClean="0"/>
-              <a:t>2021/6/3</a:t>
+              <a:t>2021/6/10</a:t>
             </a:fld>
             <a:endParaRPr lang="zh-TW" altLang="en-US"/>
           </a:p>
@@ -2072,7 +2072,7 @@
           <a:p>
             <a:fld id="{5BBEAD13-0566-4C6C-97E7-55F17F24B09F}" type="datetimeFigureOut">
               <a:rPr lang="zh-TW" altLang="en-US" smtClean="0"/>
-              <a:t>2021/6/3</a:t>
+              <a:t>2021/6/10</a:t>
             </a:fld>
             <a:endParaRPr lang="zh-TW" altLang="en-US"/>
           </a:p>
@@ -2489,7 +2489,7 @@
           <a:p>
             <a:fld id="{5BBEAD13-0566-4C6C-97E7-55F17F24B09F}" type="datetimeFigureOut">
               <a:rPr lang="zh-TW" altLang="en-US" smtClean="0"/>
-              <a:t>2021/6/3</a:t>
+              <a:t>2021/6/10</a:t>
             </a:fld>
             <a:endParaRPr lang="zh-TW" altLang="en-US"/>
           </a:p>
@@ -2602,7 +2602,7 @@
           <a:p>
             <a:fld id="{5BBEAD13-0566-4C6C-97E7-55F17F24B09F}" type="datetimeFigureOut">
               <a:rPr lang="zh-TW" altLang="en-US" smtClean="0"/>
-              <a:t>2021/6/3</a:t>
+              <a:t>2021/6/10</a:t>
             </a:fld>
             <a:endParaRPr lang="zh-TW" altLang="en-US"/>
           </a:p>
@@ -2692,7 +2692,7 @@
           <a:p>
             <a:fld id="{5BBEAD13-0566-4C6C-97E7-55F17F24B09F}" type="datetimeFigureOut">
               <a:rPr lang="zh-TW" altLang="en-US" smtClean="0"/>
-              <a:t>2021/6/3</a:t>
+              <a:t>2021/6/10</a:t>
             </a:fld>
             <a:endParaRPr lang="zh-TW" altLang="en-US"/>
           </a:p>
@@ -2964,7 +2964,7 @@
           <a:p>
             <a:fld id="{5BBEAD13-0566-4C6C-97E7-55F17F24B09F}" type="datetimeFigureOut">
               <a:rPr lang="zh-TW" altLang="en-US" smtClean="0"/>
-              <a:t>2021/6/3</a:t>
+              <a:t>2021/6/10</a:t>
             </a:fld>
             <a:endParaRPr lang="zh-TW" altLang="en-US"/>
           </a:p>
@@ -3216,7 +3216,7 @@
           <a:p>
             <a:fld id="{5BBEAD13-0566-4C6C-97E7-55F17F24B09F}" type="datetimeFigureOut">
               <a:rPr lang="zh-TW" altLang="en-US" smtClean="0"/>
-              <a:t>2021/6/3</a:t>
+              <a:t>2021/6/10</a:t>
             </a:fld>
             <a:endParaRPr lang="zh-TW" altLang="en-US"/>
           </a:p>
@@ -3429,7 +3429,7 @@
           <a:p>
             <a:fld id="{5BBEAD13-0566-4C6C-97E7-55F17F24B09F}" type="datetimeFigureOut">
               <a:rPr lang="zh-TW" altLang="en-US" smtClean="0"/>
-              <a:t>2021/6/3</a:t>
+              <a:t>2021/6/10</a:t>
             </a:fld>
             <a:endParaRPr lang="zh-TW" altLang="en-US"/>
           </a:p>

</xml_diff>